<commit_message>
SCR 02 Blocksatz und Text überarbeitet
</commit_message>
<xml_diff>
--- a/training-cards/music moves/Scrum (SCR)/ger/apprentice/ger_SCR_04_Fertig_geübt_MM_A.pptx
+++ b/training-cards/music moves/Scrum (SCR)/ger/apprentice/ger_SCR_04_Fertig_geübt_MM_A.pptx
@@ -303,7 +303,7 @@
           <a:p>
             <a:fld id="{49091F3B-1474-5C48-BEAF-ECC63075576C}" type="datetimeFigureOut">
               <a:rPr lang="de-DE" smtClean="0"/>
-              <a:t>23.07.23</a:t>
+              <a:t>02.08.24</a:t>
             </a:fld>
             <a:endParaRPr lang="de-DE"/>
           </a:p>
@@ -471,7 +471,7 @@
           <a:p>
             <a:fld id="{49091F3B-1474-5C48-BEAF-ECC63075576C}" type="datetimeFigureOut">
               <a:rPr lang="de-DE" smtClean="0"/>
-              <a:t>23.07.23</a:t>
+              <a:t>02.08.24</a:t>
             </a:fld>
             <a:endParaRPr lang="de-DE"/>
           </a:p>
@@ -649,7 +649,7 @@
           <a:p>
             <a:fld id="{49091F3B-1474-5C48-BEAF-ECC63075576C}" type="datetimeFigureOut">
               <a:rPr lang="de-DE" smtClean="0"/>
-              <a:t>23.07.23</a:t>
+              <a:t>02.08.24</a:t>
             </a:fld>
             <a:endParaRPr lang="de-DE"/>
           </a:p>
@@ -817,7 +817,7 @@
           <a:p>
             <a:fld id="{49091F3B-1474-5C48-BEAF-ECC63075576C}" type="datetimeFigureOut">
               <a:rPr lang="de-DE" smtClean="0"/>
-              <a:t>23.07.23</a:t>
+              <a:t>02.08.24</a:t>
             </a:fld>
             <a:endParaRPr lang="de-DE"/>
           </a:p>
@@ -1062,7 +1062,7 @@
           <a:p>
             <a:fld id="{49091F3B-1474-5C48-BEAF-ECC63075576C}" type="datetimeFigureOut">
               <a:rPr lang="de-DE" smtClean="0"/>
-              <a:t>23.07.23</a:t>
+              <a:t>02.08.24</a:t>
             </a:fld>
             <a:endParaRPr lang="de-DE"/>
           </a:p>
@@ -1347,7 +1347,7 @@
           <a:p>
             <a:fld id="{49091F3B-1474-5C48-BEAF-ECC63075576C}" type="datetimeFigureOut">
               <a:rPr lang="de-DE" smtClean="0"/>
-              <a:t>23.07.23</a:t>
+              <a:t>02.08.24</a:t>
             </a:fld>
             <a:endParaRPr lang="de-DE"/>
           </a:p>
@@ -1771,7 +1771,7 @@
           <a:p>
             <a:fld id="{49091F3B-1474-5C48-BEAF-ECC63075576C}" type="datetimeFigureOut">
               <a:rPr lang="de-DE" smtClean="0"/>
-              <a:t>23.07.23</a:t>
+              <a:t>02.08.24</a:t>
             </a:fld>
             <a:endParaRPr lang="de-DE"/>
           </a:p>
@@ -1888,7 +1888,7 @@
           <a:p>
             <a:fld id="{49091F3B-1474-5C48-BEAF-ECC63075576C}" type="datetimeFigureOut">
               <a:rPr lang="de-DE" smtClean="0"/>
-              <a:t>23.07.23</a:t>
+              <a:t>02.08.24</a:t>
             </a:fld>
             <a:endParaRPr lang="de-DE"/>
           </a:p>
@@ -1983,7 +1983,7 @@
           <a:p>
             <a:fld id="{49091F3B-1474-5C48-BEAF-ECC63075576C}" type="datetimeFigureOut">
               <a:rPr lang="de-DE" smtClean="0"/>
-              <a:t>23.07.23</a:t>
+              <a:t>02.08.24</a:t>
             </a:fld>
             <a:endParaRPr lang="de-DE"/>
           </a:p>
@@ -2258,7 +2258,7 @@
           <a:p>
             <a:fld id="{49091F3B-1474-5C48-BEAF-ECC63075576C}" type="datetimeFigureOut">
               <a:rPr lang="de-DE" smtClean="0"/>
-              <a:t>23.07.23</a:t>
+              <a:t>02.08.24</a:t>
             </a:fld>
             <a:endParaRPr lang="de-DE"/>
           </a:p>
@@ -2510,7 +2510,7 @@
           <a:p>
             <a:fld id="{49091F3B-1474-5C48-BEAF-ECC63075576C}" type="datetimeFigureOut">
               <a:rPr lang="de-DE" smtClean="0"/>
-              <a:t>23.07.23</a:t>
+              <a:t>02.08.24</a:t>
             </a:fld>
             <a:endParaRPr lang="de-DE"/>
           </a:p>
@@ -2721,7 +2721,7 @@
           <a:p>
             <a:fld id="{49091F3B-1474-5C48-BEAF-ECC63075576C}" type="datetimeFigureOut">
               <a:rPr lang="de-DE" smtClean="0"/>
-              <a:t>23.07.23</a:t>
+              <a:t>02.08.24</a:t>
             </a:fld>
             <a:endParaRPr lang="de-DE"/>
           </a:p>
@@ -3332,7 +3332,7 @@
         <p:spPr>
           <a:xfrm>
             <a:off x="865450" y="1448584"/>
-            <a:ext cx="5942053" cy="3062378"/>
+            <a:ext cx="5942053" cy="3462486"/>
           </a:xfrm>
           <a:prstGeom prst="rect">
             <a:avLst/>
@@ -3350,14 +3350,14 @@
           </a:bodyPr>
           <a:lstStyle/>
           <a:p>
-            <a:pPr marL="271463" lvl="0" indent="-271463">
+            <a:pPr marL="271463" lvl="0" indent="-271463" algn="just">
               <a:buSzPct val="170000"/>
               <a:buBlip>
                 <a:blip r:embed="rId3"/>
               </a:buBlip>
             </a:pPr>
             <a:r>
-              <a:rPr lang="de-DE" sz="800" dirty="0">
+              <a:rPr lang="de-DE" sz="1000" dirty="0">
                 <a:solidFill>
                   <a:srgbClr val="747982"/>
                 </a:solidFill>
@@ -3367,7 +3367,7 @@
               <a:t>Die so genannte „Definition </a:t>
             </a:r>
             <a:r>
-              <a:rPr lang="de-DE" sz="800" dirty="0" err="1">
+              <a:rPr lang="de-DE" sz="1000" dirty="0" err="1">
                 <a:solidFill>
                   <a:srgbClr val="747982"/>
                 </a:solidFill>
@@ -3377,7 +3377,7 @@
               <a:t>of</a:t>
             </a:r>
             <a:r>
-              <a:rPr lang="de-DE" sz="800" dirty="0">
+              <a:rPr lang="de-DE" sz="1000" dirty="0">
                 <a:solidFill>
                   <a:srgbClr val="747982"/>
                 </a:solidFill>
@@ -3387,7 +3387,7 @@
               <a:t> </a:t>
             </a:r>
             <a:r>
-              <a:rPr lang="de-DE" sz="800" dirty="0" err="1">
+              <a:rPr lang="de-DE" sz="1000" dirty="0" err="1">
                 <a:solidFill>
                   <a:srgbClr val="747982"/>
                 </a:solidFill>
@@ -3397,21 +3397,21 @@
               <a:t>Done</a:t>
             </a:r>
             <a:r>
-              <a:rPr lang="de-DE" sz="800" dirty="0">
-                <a:solidFill>
-                  <a:srgbClr val="747982"/>
-                </a:solidFill>
-                <a:latin typeface="Avenir Book"/>
-                <a:cs typeface="Avenir Book"/>
-              </a:rPr>
-              <a:t>“ bezeichnet in der Softwareentwicklung das gemeinsame Verständnis eines Entwicklerteams, wann eine Aufgabe als „fertig“ betrachtet wird.</a:t>
-            </a:r>
-          </a:p>
-          <a:p>
-            <a:pPr lvl="0">
+              <a:rPr lang="de-DE" sz="1000" dirty="0">
+                <a:solidFill>
+                  <a:srgbClr val="747982"/>
+                </a:solidFill>
+                <a:latin typeface="Avenir Book"/>
+                <a:cs typeface="Avenir Book"/>
+              </a:rPr>
+              <a:t>“ bezeichnet in der Softwareentwicklung das gemeinsame Verständnis eines Entwicklerteams, wann eine Aufgabe als „fertig“ betrachtet wird, weil es alle nötigen Qualitätskriterien erfüllt.</a:t>
+            </a:r>
+          </a:p>
+          <a:p>
+            <a:pPr lvl="0" algn="just">
               <a:buSzPct val="170000"/>
             </a:pPr>
-            <a:endParaRPr lang="de-DE" sz="800" dirty="0">
+            <a:endParaRPr lang="de-DE" sz="1000" dirty="0">
               <a:solidFill>
                 <a:srgbClr val="747982"/>
               </a:solidFill>
@@ -3420,14 +3420,14 @@
             </a:endParaRPr>
           </a:p>
           <a:p>
-            <a:pPr marL="271463" lvl="0" indent="-271463">
+            <a:pPr marL="271463" lvl="0" indent="-271463" algn="just">
               <a:buSzPct val="170000"/>
               <a:buBlip>
                 <a:blip r:embed="rId3"/>
               </a:buBlip>
             </a:pPr>
             <a:r>
-              <a:rPr lang="de-DE" sz="800" dirty="0">
+              <a:rPr lang="de-DE" sz="1000" dirty="0">
                 <a:solidFill>
                   <a:srgbClr val="747982"/>
                 </a:solidFill>
@@ -3437,7 +3437,7 @@
               <a:t>Jedes Team legt seine eigene Definition </a:t>
             </a:r>
             <a:r>
-              <a:rPr lang="de-DE" sz="800" dirty="0" err="1">
+              <a:rPr lang="de-DE" sz="1000" dirty="0" err="1">
                 <a:solidFill>
                   <a:srgbClr val="747982"/>
                 </a:solidFill>
@@ -3447,7 +3447,7 @@
               <a:t>of</a:t>
             </a:r>
             <a:r>
-              <a:rPr lang="de-DE" sz="800" dirty="0">
+              <a:rPr lang="de-DE" sz="1000" dirty="0">
                 <a:solidFill>
                   <a:srgbClr val="747982"/>
                 </a:solidFill>
@@ -3457,7 +3457,7 @@
               <a:t> </a:t>
             </a:r>
             <a:r>
-              <a:rPr lang="de-DE" sz="800" dirty="0" err="1">
+              <a:rPr lang="de-DE" sz="1000" dirty="0" err="1">
                 <a:solidFill>
                   <a:srgbClr val="747982"/>
                 </a:solidFill>
@@ -3467,21 +3467,21 @@
               <a:t>Done</a:t>
             </a:r>
             <a:r>
-              <a:rPr lang="de-DE" sz="800" dirty="0">
-                <a:solidFill>
-                  <a:srgbClr val="747982"/>
-                </a:solidFill>
-                <a:latin typeface="Avenir Book"/>
-                <a:cs typeface="Avenir Book"/>
-              </a:rPr>
-              <a:t> fest. Es soll eine Richtschnur sein, auf welche Weise entwickelt wird und welche Qualitätsstandards eingehalten werden.</a:t>
-            </a:r>
-          </a:p>
-          <a:p>
-            <a:pPr lvl="0">
+              <a:rPr lang="de-DE" sz="1000" dirty="0">
+                <a:solidFill>
+                  <a:srgbClr val="747982"/>
+                </a:solidFill>
+                <a:latin typeface="Avenir Book"/>
+                <a:cs typeface="Avenir Book"/>
+              </a:rPr>
+              <a:t> fest. Es soll eine Richtschnur sein, auf welche Qualitätsstandards man sich geeinigt hat.</a:t>
+            </a:r>
+          </a:p>
+          <a:p>
+            <a:pPr lvl="0" algn="just">
               <a:buSzPct val="170000"/>
             </a:pPr>
-            <a:endParaRPr lang="de-DE" sz="800" dirty="0">
+            <a:endParaRPr lang="de-DE" sz="1000" dirty="0">
               <a:solidFill>
                 <a:srgbClr val="747982"/>
               </a:solidFill>
@@ -3490,14 +3490,14 @@
             </a:endParaRPr>
           </a:p>
           <a:p>
-            <a:pPr marL="271463" lvl="0" indent="-271463">
+            <a:pPr marL="271463" lvl="0" indent="-271463" algn="just">
               <a:buSzPct val="170000"/>
               <a:buBlip>
                 <a:blip r:embed="rId3"/>
               </a:buBlip>
             </a:pPr>
             <a:r>
-              <a:rPr lang="de-DE" sz="800" dirty="0">
+              <a:rPr lang="de-DE" sz="1000" dirty="0">
                 <a:solidFill>
                   <a:srgbClr val="747982"/>
                 </a:solidFill>
@@ -3508,10 +3508,10 @@
             </a:r>
           </a:p>
           <a:p>
-            <a:pPr lvl="0">
+            <a:pPr lvl="0" algn="just">
               <a:buSzPct val="170000"/>
             </a:pPr>
-            <a:endParaRPr lang="de-DE" sz="800" dirty="0">
+            <a:endParaRPr lang="de-DE" sz="1000" dirty="0">
               <a:solidFill>
                 <a:srgbClr val="747982"/>
               </a:solidFill>
@@ -3520,68 +3520,28 @@
             </a:endParaRPr>
           </a:p>
           <a:p>
-            <a:pPr marL="271463" lvl="0" indent="-271463">
+            <a:pPr marL="271463" lvl="0" indent="-271463" algn="just">
               <a:buSzPct val="170000"/>
               <a:buBlip>
                 <a:blip r:embed="rId3"/>
               </a:buBlip>
             </a:pPr>
             <a:r>
-              <a:rPr lang="de-DE" sz="800" dirty="0">
-                <a:solidFill>
-                  <a:srgbClr val="747982"/>
-                </a:solidFill>
-                <a:latin typeface="Avenir Book"/>
-                <a:cs typeface="Avenir Book"/>
-              </a:rPr>
-              <a:t>Die Qualität in der Software steigert sich, je mehr unterschiedliche Säulen und Aspekte eine Definition </a:t>
-            </a:r>
-            <a:r>
-              <a:rPr lang="de-DE" sz="800" dirty="0" err="1">
-                <a:solidFill>
-                  <a:srgbClr val="747982"/>
-                </a:solidFill>
-                <a:latin typeface="Avenir Book"/>
-                <a:cs typeface="Avenir Book"/>
-              </a:rPr>
-              <a:t>of</a:t>
-            </a:r>
-            <a:r>
-              <a:rPr lang="de-DE" sz="800" dirty="0">
-                <a:solidFill>
-                  <a:srgbClr val="747982"/>
-                </a:solidFill>
-                <a:latin typeface="Avenir Book"/>
-                <a:cs typeface="Avenir Book"/>
-              </a:rPr>
-              <a:t> </a:t>
-            </a:r>
-            <a:r>
-              <a:rPr lang="de-DE" sz="800" dirty="0" err="1">
-                <a:solidFill>
-                  <a:srgbClr val="747982"/>
-                </a:solidFill>
-                <a:latin typeface="Avenir Book"/>
-                <a:cs typeface="Avenir Book"/>
-              </a:rPr>
-              <a:t>Done</a:t>
-            </a:r>
-            <a:r>
-              <a:rPr lang="de-DE" sz="800" dirty="0">
-                <a:solidFill>
-                  <a:srgbClr val="747982"/>
-                </a:solidFill>
-                <a:latin typeface="Avenir Book"/>
-                <a:cs typeface="Avenir Book"/>
-              </a:rPr>
-              <a:t> aufweist.</a:t>
-            </a:r>
-          </a:p>
-          <a:p>
-            <a:pPr lvl="0">
+              <a:rPr lang="de-DE" sz="1000" dirty="0">
+                <a:solidFill>
+                  <a:srgbClr val="747982"/>
+                </a:solidFill>
+                <a:latin typeface="Avenir Book"/>
+                <a:cs typeface="Avenir Book"/>
+              </a:rPr>
+              <a:t>Wann ist ein Stück, eine Phrase für Musizierende fertig? Wenn Du genug von einer Phrase verstanden hast, stellt sich irgendwann ein Gefühl der Ruhe ein. Es bleibt, auch wenn Du Fehler spielst, weil Du die Phrase kennst, sie verinnerlicht hast. </a:t>
+            </a:r>
+          </a:p>
+          <a:p>
+            <a:pPr lvl="0" algn="just">
               <a:buSzPct val="170000"/>
             </a:pPr>
-            <a:endParaRPr lang="de-DE" sz="800" dirty="0">
+            <a:endParaRPr lang="de-DE" sz="1000" dirty="0">
               <a:solidFill>
                 <a:srgbClr val="747982"/>
               </a:solidFill>
@@ -3590,28 +3550,28 @@
             </a:endParaRPr>
           </a:p>
           <a:p>
-            <a:pPr marL="271463" lvl="0" indent="-271463">
+            <a:pPr marL="271463" lvl="0" indent="-271463" algn="just">
               <a:buSzPct val="170000"/>
               <a:buBlip>
                 <a:blip r:embed="rId3"/>
               </a:buBlip>
             </a:pPr>
             <a:r>
-              <a:rPr lang="de-DE" sz="800" dirty="0">
-                <a:solidFill>
-                  <a:srgbClr val="747982"/>
-                </a:solidFill>
-                <a:latin typeface="Avenir Book"/>
-                <a:cs typeface="Avenir Book"/>
-              </a:rPr>
-              <a:t>Deine Musikalität steigert sich durch die Menge an Blickwinkeln auf Dein Stück, für die Du ein Verständnis gewonnen hast.</a:t>
-            </a:r>
-          </a:p>
-          <a:p>
-            <a:pPr lvl="0">
+              <a:rPr lang="de-DE" sz="1000" dirty="0">
+                <a:solidFill>
+                  <a:srgbClr val="747982"/>
+                </a:solidFill>
+                <a:latin typeface="Avenir Book"/>
+                <a:cs typeface="Avenir Book"/>
+              </a:rPr>
+              <a:t>Es geht nicht mehr darum, so lange zu üben, bis Du fehlerfrei spielst, sondern bis du frei spielst. </a:t>
+            </a:r>
+          </a:p>
+          <a:p>
+            <a:pPr lvl="0" algn="just">
               <a:buSzPct val="170000"/>
             </a:pPr>
-            <a:endParaRPr lang="de-DE" sz="800" dirty="0">
+            <a:endParaRPr lang="de-DE" sz="1000" dirty="0">
               <a:solidFill>
                 <a:srgbClr val="747982"/>
               </a:solidFill>
@@ -3620,28 +3580,88 @@
             </a:endParaRPr>
           </a:p>
           <a:p>
-            <a:pPr marL="271463" lvl="0" indent="-271463">
+            <a:pPr marL="271463" lvl="0" indent="-271463" algn="just">
               <a:buSzPct val="170000"/>
               <a:buBlip>
                 <a:blip r:embed="rId3"/>
               </a:buBlip>
             </a:pPr>
             <a:r>
-              <a:rPr lang="de-DE" sz="800" dirty="0">
-                <a:solidFill>
-                  <a:srgbClr val="747982"/>
-                </a:solidFill>
-                <a:latin typeface="Avenir Book"/>
-                <a:cs typeface="Avenir Book"/>
-              </a:rPr>
-              <a:t>Wann ist eine User Story = eine Phrase für Musizierende fertig? Wenn Du genug von einer Phrase verstanden hast, stellt sich irgendwann ein Gefühl der Ruhe ein. Es  bleibt, auch wenn Du Fehler spielst, weil Du die Phrase kennst, sie verinnerlicht hast. Je tiefer Du eine Phrase verstehst, desto höher die Wahrscheinlichkeit, dass sich Ruhe in Dir einstellt.</a:t>
-            </a:r>
-          </a:p>
-          <a:p>
-            <a:pPr lvl="0">
+              <a:rPr lang="de-DE" sz="1000" dirty="0">
+                <a:solidFill>
+                  <a:srgbClr val="747982"/>
+                </a:solidFill>
+                <a:latin typeface="Avenir Book"/>
+                <a:cs typeface="Avenir Book"/>
+              </a:rPr>
+              <a:t>Durch Deine eigene Definition </a:t>
+            </a:r>
+            <a:r>
+              <a:rPr lang="de-DE" sz="1000" dirty="0" err="1">
+                <a:solidFill>
+                  <a:srgbClr val="747982"/>
+                </a:solidFill>
+                <a:latin typeface="Avenir Book"/>
+                <a:cs typeface="Avenir Book"/>
+              </a:rPr>
+              <a:t>of</a:t>
+            </a:r>
+            <a:r>
+              <a:rPr lang="de-DE" sz="1000" dirty="0">
+                <a:solidFill>
+                  <a:srgbClr val="747982"/>
+                </a:solidFill>
+                <a:latin typeface="Avenir Book"/>
+                <a:cs typeface="Avenir Book"/>
+              </a:rPr>
+              <a:t> </a:t>
+            </a:r>
+            <a:r>
+              <a:rPr lang="de-DE" sz="1000" dirty="0" err="1">
+                <a:solidFill>
+                  <a:srgbClr val="747982"/>
+                </a:solidFill>
+                <a:latin typeface="Avenir Book"/>
+                <a:cs typeface="Avenir Book"/>
+              </a:rPr>
+              <a:t>Done</a:t>
+            </a:r>
+            <a:r>
+              <a:rPr lang="de-DE" sz="1000" dirty="0">
+                <a:solidFill>
+                  <a:srgbClr val="747982"/>
+                </a:solidFill>
+                <a:latin typeface="Avenir Book"/>
+                <a:cs typeface="Avenir Book"/>
+              </a:rPr>
+              <a:t> für eine Phrase, bist Du irgendwann mit einer Stelle fertig. Das vermeidet ein </a:t>
+            </a:r>
+            <a:r>
+              <a:rPr lang="de-DE" sz="1000" dirty="0" err="1">
+                <a:solidFill>
+                  <a:srgbClr val="747982"/>
+                </a:solidFill>
+                <a:latin typeface="Avenir Book"/>
+                <a:cs typeface="Avenir Book"/>
+              </a:rPr>
+              <a:t>Totüben</a:t>
+            </a:r>
+            <a:r>
+              <a:rPr lang="de-DE" sz="1000" dirty="0">
+                <a:solidFill>
+                  <a:srgbClr val="747982"/>
+                </a:solidFill>
+                <a:latin typeface="Avenir Book"/>
+                <a:cs typeface="Avenir Book"/>
+              </a:rPr>
+              <a:t> des Stückes.</a:t>
+            </a:r>
+          </a:p>
+          <a:p>
+            <a:pPr lvl="0" algn="just">
               <a:buSzPct val="170000"/>
             </a:pPr>
-            <a:endParaRPr lang="de-DE" sz="800" dirty="0">
+            <a:endParaRPr lang="de-DE" sz="1000" dirty="0">
               <a:solidFill>
                 <a:srgbClr val="747982"/>
               </a:solidFill>
@@ -3650,54 +3670,24 @@
             </a:endParaRPr>
           </a:p>
           <a:p>
-            <a:pPr marL="271463" lvl="0" indent="-271463">
+            <a:pPr marL="271463" lvl="0" indent="-271463" algn="just">
               <a:buSzPct val="170000"/>
               <a:buBlip>
                 <a:blip r:embed="rId3"/>
               </a:buBlip>
             </a:pPr>
             <a:r>
-              <a:rPr lang="de-DE" sz="800" dirty="0">
-                <a:solidFill>
-                  <a:srgbClr val="747982"/>
-                </a:solidFill>
-                <a:latin typeface="Avenir Book"/>
-                <a:cs typeface="Avenir Book"/>
-              </a:rPr>
-              <a:t>Es geht nicht mehr darum, so lange zu üben, bis Du fehlerfrei spielst, sondern bis du frei spielst. </a:t>
-            </a:r>
-          </a:p>
-          <a:p>
-            <a:pPr lvl="0">
-              <a:buSzPct val="170000"/>
-            </a:pPr>
-            <a:endParaRPr lang="de-DE" sz="800" dirty="0">
-              <a:solidFill>
-                <a:srgbClr val="747982"/>
-              </a:solidFill>
-              <a:latin typeface="Avenir Book"/>
-              <a:cs typeface="Avenir Book"/>
-            </a:endParaRPr>
-          </a:p>
-          <a:p>
-            <a:pPr marL="271463" lvl="0" indent="-271463">
-              <a:buSzPct val="170000"/>
-              <a:buBlip>
-                <a:blip r:embed="rId3"/>
-              </a:buBlip>
-            </a:pPr>
-            <a:r>
-              <a:rPr lang="de-DE" sz="800" dirty="0">
-                <a:solidFill>
-                  <a:srgbClr val="747982"/>
-                </a:solidFill>
-                <a:latin typeface="Avenir Book"/>
-                <a:cs typeface="Avenir Book"/>
-              </a:rPr>
-              <a:t>Durch Deine eigene Definition </a:t>
-            </a:r>
-            <a:r>
-              <a:rPr lang="de-DE" sz="800" dirty="0" err="1">
+              <a:rPr lang="de-DE" sz="1000" dirty="0">
+                <a:solidFill>
+                  <a:srgbClr val="747982"/>
+                </a:solidFill>
+                <a:latin typeface="Avenir Book"/>
+                <a:cs typeface="Avenir Book"/>
+              </a:rPr>
+              <a:t>Was gehört in eine Definition </a:t>
+            </a:r>
+            <a:r>
+              <a:rPr lang="de-DE" sz="1000" dirty="0" err="1">
                 <a:solidFill>
                   <a:srgbClr val="747982"/>
                 </a:solidFill>
@@ -3707,7 +3697,7 @@
               <a:t>of</a:t>
             </a:r>
             <a:r>
-              <a:rPr lang="de-DE" sz="800" dirty="0">
+              <a:rPr lang="de-DE" sz="1000" dirty="0">
                 <a:solidFill>
                   <a:srgbClr val="747982"/>
                 </a:solidFill>
@@ -3717,7 +3707,7 @@
               <a:t> </a:t>
             </a:r>
             <a:r>
-              <a:rPr lang="de-DE" sz="800" dirty="0" err="1">
+              <a:rPr lang="de-DE" sz="1000" dirty="0" err="1">
                 <a:solidFill>
                   <a:srgbClr val="747982"/>
                 </a:solidFill>
@@ -3727,97 +3717,7 @@
               <a:t>Done</a:t>
             </a:r>
             <a:r>
-              <a:rPr lang="de-DE" sz="800" dirty="0">
-                <a:solidFill>
-                  <a:srgbClr val="747982"/>
-                </a:solidFill>
-                <a:latin typeface="Avenir Book"/>
-                <a:cs typeface="Avenir Book"/>
-              </a:rPr>
-              <a:t> für eine Phrase, bist Du irgendwann mit einer Stelle fertig. Das vermeidet ein </a:t>
-            </a:r>
-            <a:r>
-              <a:rPr lang="de-DE" sz="800" dirty="0" err="1">
-                <a:solidFill>
-                  <a:srgbClr val="747982"/>
-                </a:solidFill>
-                <a:latin typeface="Avenir Book"/>
-                <a:cs typeface="Avenir Book"/>
-              </a:rPr>
-              <a:t>Totüben</a:t>
-            </a:r>
-            <a:r>
-              <a:rPr lang="de-DE" sz="800" dirty="0">
-                <a:solidFill>
-                  <a:srgbClr val="747982"/>
-                </a:solidFill>
-                <a:latin typeface="Avenir Book"/>
-                <a:cs typeface="Avenir Book"/>
-              </a:rPr>
-              <a:t> des Stückes.</a:t>
-            </a:r>
-          </a:p>
-          <a:p>
-            <a:pPr lvl="0">
-              <a:buSzPct val="170000"/>
-            </a:pPr>
-            <a:endParaRPr lang="de-DE" sz="800" dirty="0">
-              <a:solidFill>
-                <a:srgbClr val="747982"/>
-              </a:solidFill>
-              <a:latin typeface="Avenir Book"/>
-              <a:cs typeface="Avenir Book"/>
-            </a:endParaRPr>
-          </a:p>
-          <a:p>
-            <a:pPr marL="271463" lvl="0" indent="-271463">
-              <a:buSzPct val="170000"/>
-              <a:buBlip>
-                <a:blip r:embed="rId3"/>
-              </a:buBlip>
-            </a:pPr>
-            <a:r>
-              <a:rPr lang="de-DE" sz="800" dirty="0">
-                <a:solidFill>
-                  <a:srgbClr val="747982"/>
-                </a:solidFill>
-                <a:latin typeface="Avenir Book"/>
-                <a:cs typeface="Avenir Book"/>
-              </a:rPr>
-              <a:t>Was gehört in eine Definition </a:t>
-            </a:r>
-            <a:r>
-              <a:rPr lang="de-DE" sz="800" dirty="0" err="1">
-                <a:solidFill>
-                  <a:srgbClr val="747982"/>
-                </a:solidFill>
-                <a:latin typeface="Avenir Book"/>
-                <a:cs typeface="Avenir Book"/>
-              </a:rPr>
-              <a:t>of</a:t>
-            </a:r>
-            <a:r>
-              <a:rPr lang="de-DE" sz="800" dirty="0">
-                <a:solidFill>
-                  <a:srgbClr val="747982"/>
-                </a:solidFill>
-                <a:latin typeface="Avenir Book"/>
-                <a:cs typeface="Avenir Book"/>
-              </a:rPr>
-              <a:t> </a:t>
-            </a:r>
-            <a:r>
-              <a:rPr lang="de-DE" sz="800" dirty="0" err="1">
-                <a:solidFill>
-                  <a:srgbClr val="747982"/>
-                </a:solidFill>
-                <a:latin typeface="Avenir Book"/>
-                <a:cs typeface="Avenir Book"/>
-              </a:rPr>
-              <a:t>Done</a:t>
-            </a:r>
-            <a:r>
-              <a:rPr lang="de-DE" sz="800" dirty="0">
+              <a:rPr lang="de-DE" sz="1000" dirty="0">
                 <a:solidFill>
                   <a:srgbClr val="747982"/>
                 </a:solidFill>
@@ -3828,7 +3728,7 @@
             </a:r>
           </a:p>
           <a:p>
-            <a:pPr marL="271463" lvl="0" indent="-271463">
+            <a:pPr marL="271463" lvl="0" indent="-271463" algn="just">
               <a:buSzPct val="170000"/>
               <a:buBlip>
                 <a:blip r:embed="rId3"/>
@@ -4161,8 +4061,8 @@
         </p:nvSpPr>
         <p:spPr>
           <a:xfrm>
-            <a:off x="810398" y="1288295"/>
-            <a:ext cx="5942053" cy="3416320"/>
+            <a:off x="810398" y="1194496"/>
+            <a:ext cx="6345333" cy="3539430"/>
           </a:xfrm>
           <a:prstGeom prst="rect">
             <a:avLst/>
@@ -4180,7 +4080,7 @@
           </a:bodyPr>
           <a:lstStyle/>
           <a:p>
-            <a:pPr marL="271463" indent="-271463">
+            <a:pPr marL="271463" indent="-271463" algn="just">
               <a:buSzPct val="170000"/>
               <a:buBlip>
                 <a:blip r:embed="rId3"/>
@@ -4234,7 +4134,7 @@
                 <a:latin typeface="Avenir Book"/>
                 <a:cs typeface="Avenir Book"/>
               </a:rPr>
-              <a:t>. Greife Dir die beiden schwierigsten Phrasen Deines Stückes heraus und arbeite erst an ihnen. Nimm Dir für eine Tomate (siehe TOM-01) je einen Aspekt heraus, den Du bearbeitest. </a:t>
+              <a:t>. Greife Dir die beiden schwierigsten Phrasen Deines Stückes und beginne mit ihnen. Nimm Dir für eine Tomate (siehe TOM-01) je einen Aspekt heraus, den Du bearbeitest. </a:t>
             </a:r>
           </a:p>
           <a:p>
@@ -4620,46 +4520,6 @@
               </a:rPr>
               <a:t>Wie viele verschiedene Aspekte beinhaltet die Definition </a:t>
             </a:r>
-            <a:r>
-              <a:rPr lang="de-DE" sz="800" dirty="0" err="1">
-                <a:solidFill>
-                  <a:srgbClr val="747982"/>
-                </a:solidFill>
-                <a:latin typeface="Avenir Book"/>
-                <a:cs typeface="Avenir Book"/>
-              </a:rPr>
-              <a:t>of</a:t>
-            </a:r>
-            <a:r>
-              <a:rPr lang="de-DE" sz="800" dirty="0">
-                <a:solidFill>
-                  <a:srgbClr val="747982"/>
-                </a:solidFill>
-                <a:latin typeface="Avenir Book"/>
-                <a:cs typeface="Avenir Book"/>
-              </a:rPr>
-              <a:t> </a:t>
-            </a:r>
-            <a:r>
-              <a:rPr lang="de-DE" sz="800" dirty="0" err="1">
-                <a:solidFill>
-                  <a:srgbClr val="747982"/>
-                </a:solidFill>
-                <a:latin typeface="Avenir Book"/>
-                <a:cs typeface="Avenir Book"/>
-              </a:rPr>
-              <a:t>Done</a:t>
-            </a:r>
-            <a:r>
-              <a:rPr lang="de-DE" sz="800" dirty="0">
-                <a:solidFill>
-                  <a:srgbClr val="747982"/>
-                </a:solidFill>
-                <a:latin typeface="Avenir Book"/>
-                <a:cs typeface="Avenir Book"/>
-              </a:rPr>
-              <a:t>?</a:t>
-            </a:r>
           </a:p>
           <a:p>
             <a:pPr marL="639829" lvl="1" indent="-271463">
@@ -4668,6 +4528,16 @@
               <a:buChar char="•"/>
             </a:pPr>
             <a:r>
+              <a:rPr lang="de-DE" sz="800" dirty="0" err="1">
+                <a:solidFill>
+                  <a:srgbClr val="747982"/>
+                </a:solidFill>
+                <a:latin typeface="Avenir Book"/>
+                <a:cs typeface="Avenir Book"/>
+              </a:rPr>
+              <a:t>of</a:t>
+            </a:r>
+            <a:r>
               <a:rPr lang="de-DE" sz="800" dirty="0">
                 <a:solidFill>
                   <a:srgbClr val="747982"/>
@@ -4675,8 +4545,52 @@
                 <a:latin typeface="Avenir Book"/>
                 <a:cs typeface="Avenir Book"/>
               </a:rPr>
+              <a:t> </a:t>
+            </a:r>
+            <a:r>
+              <a:rPr lang="de-DE" sz="800" dirty="0" err="1">
+                <a:solidFill>
+                  <a:srgbClr val="747982"/>
+                </a:solidFill>
+                <a:latin typeface="Avenir Book"/>
+                <a:cs typeface="Avenir Book"/>
+              </a:rPr>
+              <a:t>Done</a:t>
+            </a:r>
+            <a:r>
+              <a:rPr lang="de-DE" sz="800" dirty="0">
+                <a:solidFill>
+                  <a:srgbClr val="747982"/>
+                </a:solidFill>
+                <a:latin typeface="Avenir Book"/>
+                <a:cs typeface="Avenir Book"/>
+              </a:rPr>
+              <a:t>?</a:t>
+            </a:r>
+          </a:p>
+          <a:p>
+            <a:pPr marL="639829" lvl="1" indent="-271463">
+              <a:buSzPct val="100000"/>
+              <a:buFont typeface="Arial"/>
+              <a:buChar char="•"/>
+            </a:pPr>
+            <a:r>
+              <a:rPr lang="de-DE" sz="800" dirty="0">
+                <a:solidFill>
+                  <a:srgbClr val="747982"/>
+                </a:solidFill>
+                <a:latin typeface="Avenir Book"/>
+                <a:cs typeface="Avenir Book"/>
+              </a:rPr>
               <a:t>Wie viel musikalisches Verständnis wurde durch die Definition </a:t>
             </a:r>
+          </a:p>
+          <a:p>
+            <a:pPr marL="639829" lvl="1" indent="-271463">
+              <a:buSzPct val="100000"/>
+              <a:buFont typeface="Arial"/>
+              <a:buChar char="•"/>
+            </a:pPr>
             <a:r>
               <a:rPr lang="de-DE" sz="800" dirty="0" err="1">
                 <a:solidFill>
@@ -4790,8 +4704,8 @@
         </p:nvSpPr>
         <p:spPr>
           <a:xfrm>
-            <a:off x="4404786" y="2150069"/>
-            <a:ext cx="2871595" cy="1815882"/>
+            <a:off x="4456969" y="1912618"/>
+            <a:ext cx="2871595" cy="2677656"/>
           </a:xfrm>
           <a:prstGeom prst="rect">
             <a:avLst/>
@@ -5026,6 +4940,82 @@
               </a:rPr>
               <a:t>Integriert</a:t>
             </a:r>
+          </a:p>
+          <a:p>
+            <a:pPr marL="228600" indent="-228600">
+              <a:buAutoNum type="arabicPeriod" startAt="8"/>
+            </a:pPr>
+            <a:r>
+              <a:rPr lang="de-DE" sz="800" dirty="0">
+                <a:solidFill>
+                  <a:srgbClr val="747982"/>
+                </a:solidFill>
+                <a:latin typeface="Avenir Book"/>
+                <a:cs typeface="Avenir Book"/>
+              </a:rPr>
+              <a:t>Interpretation:</a:t>
+            </a:r>
+          </a:p>
+          <a:p>
+            <a:pPr marL="539816" lvl="1" indent="-171450">
+              <a:buFont typeface="Arial" panose="020B0604020202020204" pitchFamily="34" charset="0"/>
+              <a:buChar char="•"/>
+            </a:pPr>
+            <a:r>
+              <a:rPr lang="de-DE" sz="800" dirty="0">
+                <a:solidFill>
+                  <a:srgbClr val="747982"/>
+                </a:solidFill>
+                <a:latin typeface="Avenir Book"/>
+                <a:cs typeface="Avenir Book"/>
+              </a:rPr>
+              <a:t>Ich bringe rüber, was ich fühle.</a:t>
+            </a:r>
+          </a:p>
+          <a:p>
+            <a:pPr marL="539816" lvl="1" indent="-171450">
+              <a:buFont typeface="Arial" panose="020B0604020202020204" pitchFamily="34" charset="0"/>
+              <a:buChar char="•"/>
+            </a:pPr>
+            <a:r>
+              <a:rPr lang="de-DE" sz="800" dirty="0">
+                <a:solidFill>
+                  <a:srgbClr val="747982"/>
+                </a:solidFill>
+                <a:latin typeface="Avenir Book"/>
+                <a:cs typeface="Avenir Book"/>
+              </a:rPr>
+              <a:t>Ich konnte zwei Menschen mit meinem Spiel begeistern</a:t>
+            </a:r>
+          </a:p>
+          <a:p>
+            <a:pPr marL="539816" lvl="1" indent="-171450">
+              <a:buFont typeface="Arial" panose="020B0604020202020204" pitchFamily="34" charset="0"/>
+              <a:buChar char="•"/>
+            </a:pPr>
+            <a:r>
+              <a:rPr lang="de-DE" sz="800" dirty="0">
+                <a:solidFill>
+                  <a:srgbClr val="747982"/>
+                </a:solidFill>
+                <a:latin typeface="Avenir Book"/>
+                <a:cs typeface="Avenir Book"/>
+              </a:rPr>
+              <a:t>Ich habe das Stück bereits einmal öffentlich aufgeführt</a:t>
+            </a:r>
+          </a:p>
+          <a:p>
+            <a:pPr marL="539816" lvl="1" indent="-171450">
+              <a:buFont typeface="Arial"/>
+              <a:buChar char="•"/>
+            </a:pPr>
+            <a:endParaRPr lang="de-DE" sz="800" dirty="0">
+              <a:solidFill>
+                <a:srgbClr val="747982"/>
+              </a:solidFill>
+              <a:latin typeface="Avenir Book"/>
+              <a:cs typeface="Avenir Book"/>
+            </a:endParaRPr>
           </a:p>
         </p:txBody>
       </p:sp>
@@ -5054,7 +5044,7 @@
           </a:ln>
           <a:extLst>
             <a:ext uri="{C572A759-6A51-4108-AA02-DFA0A04FC94B}">
-              <ma14:wrappingTextBoxFlag xmlns="" xmlns:ma14="http://schemas.microsoft.com/office/mac/drawingml/2011/main" val="1"/>
+              <ma14:wrappingTextBoxFlag xmlns:ma14="http://schemas.microsoft.com/office/mac/drawingml/2011/main" xmlns="" val="1"/>
             </a:ext>
           </a:extLst>
         </p:spPr>

</xml_diff>

<commit_message>
SCR 04 Quelle eingefügt
</commit_message>
<xml_diff>
--- a/training-cards/music moves/Scrum (SCR)/ger/apprentice/ger_SCR_04_Fertig_geübt_MM_A.pptx
+++ b/training-cards/music moves/Scrum (SCR)/ger/apprentice/ger_SCR_04_Fertig_geübt_MM_A.pptx
@@ -3331,8 +3331,8 @@
         </p:nvSpPr>
         <p:spPr>
           <a:xfrm>
-            <a:off x="865450" y="1448584"/>
-            <a:ext cx="5942053" cy="3462486"/>
+            <a:off x="913075" y="1371764"/>
+            <a:ext cx="6181204" cy="3308598"/>
           </a:xfrm>
           <a:prstGeom prst="rect">
             <a:avLst/>
@@ -3404,7 +3404,47 @@
                 <a:latin typeface="Avenir Book"/>
                 <a:cs typeface="Avenir Book"/>
               </a:rPr>
-              <a:t>“ bezeichnet in der Softwareentwicklung das gemeinsame Verständnis eines Entwicklerteams, wann eine Aufgabe als „fertig“ betrachtet wird, weil es alle nötigen Qualitätskriterien erfüllt.</a:t>
+              <a:t>“ (</a:t>
+            </a:r>
+            <a:r>
+              <a:rPr lang="de-DE" sz="1000" dirty="0" err="1">
+                <a:solidFill>
+                  <a:srgbClr val="747982"/>
+                </a:solidFill>
+                <a:latin typeface="Avenir Book"/>
+                <a:cs typeface="Avenir Book"/>
+              </a:rPr>
+              <a:t>Schwaber</a:t>
+            </a:r>
+            <a:r>
+              <a:rPr lang="de-DE" sz="1000" dirty="0">
+                <a:solidFill>
+                  <a:srgbClr val="747982"/>
+                </a:solidFill>
+                <a:latin typeface="Avenir Book"/>
+                <a:cs typeface="Avenir Book"/>
+              </a:rPr>
+              <a:t>/Sutherland 2020, S. 13) bezeichnet in der Softwareentwicklung das </a:t>
+            </a:r>
+            <a:r>
+              <a:rPr lang="de-DE" sz="1000">
+                <a:solidFill>
+                  <a:srgbClr val="747982"/>
+                </a:solidFill>
+                <a:latin typeface="Avenir Book"/>
+                <a:cs typeface="Avenir Book"/>
+              </a:rPr>
+              <a:t>gemeinsame Versprechen </a:t>
+            </a:r>
+            <a:r>
+              <a:rPr lang="de-DE" sz="1000" dirty="0">
+                <a:solidFill>
+                  <a:srgbClr val="747982"/>
+                </a:solidFill>
+                <a:latin typeface="Avenir Book"/>
+                <a:cs typeface="Avenir Book"/>
+              </a:rPr>
+              <a:t>eines Entwicklerteams, wann eine Aufgabe als „fertig“ betrachtet wird, weil es alle nötigen Qualitätskriterien erfüllt.</a:t>
             </a:r>
           </a:p>
           <a:p>
@@ -3786,6 +3826,219 @@
           <a:p>
             <a:pPr algn="ctr"/>
             <a:endParaRPr lang="de-DE"/>
+          </a:p>
+        </p:txBody>
+      </p:sp>
+      <p:sp>
+        <p:nvSpPr>
+          <p:cNvPr id="2" name="Textfeld 1">
+            <a:extLst>
+              <a:ext uri="{FF2B5EF4-FFF2-40B4-BE49-F238E27FC236}">
+                <a16:creationId xmlns:a16="http://schemas.microsoft.com/office/drawing/2014/main" id="{80AC66D3-1514-C06D-5C09-82A6E53F0345}"/>
+              </a:ext>
+            </a:extLst>
+          </p:cNvPr>
+          <p:cNvSpPr txBox="1"/>
+          <p:nvPr/>
+        </p:nvSpPr>
+        <p:spPr>
+          <a:xfrm>
+            <a:off x="913075" y="4713206"/>
+            <a:ext cx="6276077" cy="584775"/>
+          </a:xfrm>
+          <a:prstGeom prst="rect">
+            <a:avLst/>
+          </a:prstGeom>
+          <a:noFill/>
+        </p:spPr>
+        <p:txBody>
+          <a:bodyPr wrap="none" rtlCol="0">
+            <a:spAutoFit/>
+          </a:bodyPr>
+          <a:lstStyle/>
+          <a:p>
+            <a:pPr lvl="0" algn="just">
+              <a:buSzPct val="170000"/>
+            </a:pPr>
+            <a:endParaRPr lang="de-DE" sz="800" dirty="0">
+              <a:solidFill>
+                <a:srgbClr val="747982"/>
+              </a:solidFill>
+              <a:latin typeface="Avenir Book"/>
+              <a:cs typeface="Avenir Book"/>
+            </a:endParaRPr>
+          </a:p>
+          <a:p>
+            <a:pPr algn="just">
+              <a:buSzPct val="170000"/>
+            </a:pPr>
+            <a:r>
+              <a:rPr lang="de-DE" sz="800" dirty="0">
+                <a:solidFill>
+                  <a:schemeClr val="tx1">
+                    <a:lumMod val="65000"/>
+                    <a:lumOff val="35000"/>
+                  </a:schemeClr>
+                </a:solidFill>
+              </a:rPr>
+              <a:t>Quelle: </a:t>
+            </a:r>
+            <a:r>
+              <a:rPr lang="de-DE" sz="800" b="1" dirty="0" err="1">
+                <a:solidFill>
+                  <a:schemeClr val="tx1">
+                    <a:lumMod val="65000"/>
+                    <a:lumOff val="35000"/>
+                  </a:schemeClr>
+                </a:solidFill>
+              </a:rPr>
+              <a:t>Schwaber</a:t>
+            </a:r>
+            <a:r>
+              <a:rPr lang="de-DE" sz="800" dirty="0">
+                <a:solidFill>
+                  <a:schemeClr val="tx1">
+                    <a:lumMod val="65000"/>
+                    <a:lumOff val="35000"/>
+                  </a:schemeClr>
+                </a:solidFill>
+              </a:rPr>
+              <a:t>, Ken/Sutherland, Jeff (2020): Der </a:t>
+            </a:r>
+            <a:r>
+              <a:rPr lang="de-DE" sz="800" dirty="0" err="1">
+                <a:solidFill>
+                  <a:schemeClr val="tx1">
+                    <a:lumMod val="65000"/>
+                    <a:lumOff val="35000"/>
+                  </a:schemeClr>
+                </a:solidFill>
+              </a:rPr>
+              <a:t>Scrum</a:t>
+            </a:r>
+            <a:r>
+              <a:rPr lang="de-DE" sz="800" dirty="0">
+                <a:solidFill>
+                  <a:schemeClr val="tx1">
+                    <a:lumMod val="65000"/>
+                    <a:lumOff val="35000"/>
+                  </a:schemeClr>
+                </a:solidFill>
+              </a:rPr>
+              <a:t> Guide. Der gültige Leitfaden für </a:t>
+            </a:r>
+            <a:r>
+              <a:rPr lang="de-DE" sz="800" dirty="0" err="1">
+                <a:solidFill>
+                  <a:schemeClr val="tx1">
+                    <a:lumMod val="65000"/>
+                    <a:lumOff val="35000"/>
+                  </a:schemeClr>
+                </a:solidFill>
+              </a:rPr>
+              <a:t>Scrum</a:t>
+            </a:r>
+            <a:r>
+              <a:rPr lang="de-DE" sz="800" dirty="0">
+                <a:solidFill>
+                  <a:schemeClr val="tx1">
+                    <a:lumMod val="65000"/>
+                    <a:lumOff val="35000"/>
+                  </a:schemeClr>
+                </a:solidFill>
+              </a:rPr>
+              <a:t>: Die Spielregeln.  http://</a:t>
+            </a:r>
+            <a:r>
+              <a:rPr lang="de-DE" sz="800" dirty="0" err="1">
+                <a:solidFill>
+                  <a:schemeClr val="tx1">
+                    <a:lumMod val="65000"/>
+                    <a:lumOff val="35000"/>
+                  </a:schemeClr>
+                </a:solidFill>
+              </a:rPr>
+              <a:t>scrumguides.org</a:t>
+            </a:r>
+            <a:r>
+              <a:rPr lang="de-DE" sz="800" dirty="0">
+                <a:solidFill>
+                  <a:schemeClr val="tx1">
+                    <a:lumMod val="65000"/>
+                    <a:lumOff val="35000"/>
+                  </a:schemeClr>
+                </a:solidFill>
+              </a:rPr>
+              <a:t>/</a:t>
+            </a:r>
+            <a:r>
+              <a:rPr lang="de-DE" sz="800" dirty="0" err="1">
+                <a:solidFill>
+                  <a:schemeClr val="tx1">
+                    <a:lumMod val="65000"/>
+                    <a:lumOff val="35000"/>
+                  </a:schemeClr>
+                </a:solidFill>
+              </a:rPr>
+              <a:t>docs</a:t>
+            </a:r>
+            <a:r>
+              <a:rPr lang="de-DE" sz="800" dirty="0">
+                <a:solidFill>
+                  <a:schemeClr val="tx1">
+                    <a:lumMod val="65000"/>
+                    <a:lumOff val="35000"/>
+                  </a:schemeClr>
+                </a:solidFill>
+              </a:rPr>
+              <a:t>/   </a:t>
+            </a:r>
+            <a:br>
+              <a:rPr lang="de-DE" sz="800" dirty="0">
+                <a:solidFill>
+                  <a:schemeClr val="tx1">
+                    <a:lumMod val="65000"/>
+                    <a:lumOff val="35000"/>
+                  </a:schemeClr>
+                </a:solidFill>
+              </a:rPr>
+            </a:br>
+            <a:r>
+              <a:rPr lang="de-DE" sz="800" dirty="0">
+                <a:solidFill>
+                  <a:schemeClr val="tx1">
+                    <a:lumMod val="65000"/>
+                    <a:lumOff val="35000"/>
+                  </a:schemeClr>
+                </a:solidFill>
+              </a:rPr>
+              <a:t>                  </a:t>
+            </a:r>
+            <a:r>
+              <a:rPr lang="de-DE" sz="800" dirty="0" err="1">
+                <a:solidFill>
+                  <a:schemeClr val="tx1">
+                    <a:lumMod val="65000"/>
+                    <a:lumOff val="35000"/>
+                  </a:schemeClr>
+                </a:solidFill>
+              </a:rPr>
+              <a:t>scrumguide</a:t>
+            </a:r>
+            <a:r>
+              <a:rPr lang="de-DE" sz="800" dirty="0">
+                <a:solidFill>
+                  <a:schemeClr val="tx1">
+                    <a:lumMod val="65000"/>
+                    <a:lumOff val="35000"/>
+                  </a:schemeClr>
+                </a:solidFill>
+              </a:rPr>
+              <a:t>/v2020/2020-Scrum-Guide-German.pdf. Abgerufen am 25. Juli 2024</a:t>
+            </a:r>
+          </a:p>
+          <a:p>
+            <a:endParaRPr lang="de-DE" sz="800" dirty="0"/>
           </a:p>
         </p:txBody>
       </p:sp>

</xml_diff>